<commit_message>
Work on sample analysis
</commit_message>
<xml_diff>
--- a/docs/how-to-usrp.pptx
+++ b/docs/how-to-usrp.pptx
@@ -5,7 +5,7 @@
     <p:sldMasterId id="2147483648" r:id="rId1"/>
   </p:sldMasterIdLst>
   <p:notesMasterIdLst>
-    <p:notesMasterId r:id="rId53"/>
+    <p:notesMasterId r:id="rId56"/>
   </p:notesMasterIdLst>
   <p:sldIdLst>
     <p:sldId id="256" r:id="rId2"/>
@@ -59,6 +59,9 @@
     <p:sldId id="872" r:id="rId50"/>
     <p:sldId id="866" r:id="rId51"/>
     <p:sldId id="869" r:id="rId52"/>
+    <p:sldId id="887" r:id="rId53"/>
+    <p:sldId id="919" r:id="rId54"/>
+    <p:sldId id="921" r:id="rId55"/>
   </p:sldIdLst>
   <p:sldSz cx="12192000" cy="6858000"/>
   <p:notesSz cx="6858000" cy="9144000"/>
@@ -235,6 +238,13 @@
             <p14:sldId id="869"/>
           </p14:sldIdLst>
         </p14:section>
+        <p14:section name="Practical stuff" id="{8AEBAFB7-F4D7-4C04-A70B-3F1FE1512424}">
+          <p14:sldIdLst>
+            <p14:sldId id="887"/>
+            <p14:sldId id="919"/>
+            <p14:sldId id="921"/>
+          </p14:sldIdLst>
+        </p14:section>
       </p14:sectionLst>
     </p:ext>
     <p:ext uri="{EFAFB233-063F-42B5-8137-9DF3F51BA10A}">
@@ -413,7 +423,7 @@
           <a:p>
             <a:fld id="{7A71371E-0AB0-4E1B-9F79-83C8F32365BE}" type="datetimeFigureOut">
               <a:rPr lang="en-US" smtClean="0"/>
-              <a:t>2/14/2024</a:t>
+              <a:t>4/9/2024</a:t>
             </a:fld>
             <a:endParaRPr lang="en-US"/>
           </a:p>
@@ -1704,6 +1714,21 @@
           <a:p>
             <a:r>
               <a:rPr lang="en-US" dirty="0"/>
+              <a:t>https://stackoverflow.com/questions/2360734/whats-a-good-directory-structure-for-larger-c-projects-using-makefile</a:t>
+            </a:r>
+          </a:p>
+          <a:p>
+            <a:r>
+              <a:rPr lang="en-US"/>
+              <a:t>https://www.open-std.org/jtc1/sc22/wg21/docs/papers/2018/p1204r0.html</a:t>
+            </a:r>
+          </a:p>
+          <a:p>
+            <a:endParaRPr lang="en-US"/>
+          </a:p>
+          <a:p>
+            <a:r>
+              <a:rPr lang="en-US" dirty="0"/>
               <a:t>https://stackoverflow.com/questions/8304190/cmake-with-include-and-source-paths-basic-setup</a:t>
             </a:r>
           </a:p>
@@ -1850,6 +1875,105 @@
 </p:notes>
 </file>
 
+<file path=ppt/notesSlides/notesSlide20.xml><?xml version="1.0" encoding="utf-8"?>
+<p:notes xmlns:a="http://schemas.openxmlformats.org/drawingml/2006/main" xmlns:r="http://schemas.openxmlformats.org/officeDocument/2006/relationships" xmlns:p="http://schemas.openxmlformats.org/presentationml/2006/main">
+  <p:cSld>
+    <p:spTree>
+      <p:nvGrpSpPr>
+        <p:cNvPr id="1" name=""/>
+        <p:cNvGrpSpPr/>
+        <p:nvPr/>
+      </p:nvGrpSpPr>
+      <p:grpSpPr>
+        <a:xfrm>
+          <a:off x="0" y="0"/>
+          <a:ext cx="0" cy="0"/>
+          <a:chOff x="0" y="0"/>
+          <a:chExt cx="0" cy="0"/>
+        </a:xfrm>
+      </p:grpSpPr>
+      <p:sp>
+        <p:nvSpPr>
+          <p:cNvPr id="2" name="Slide Image Placeholder 1"/>
+          <p:cNvSpPr>
+            <a:spLocks noGrp="1" noRot="1" noChangeAspect="1"/>
+          </p:cNvSpPr>
+          <p:nvPr>
+            <p:ph type="sldImg"/>
+          </p:nvPr>
+        </p:nvSpPr>
+        <p:spPr/>
+      </p:sp>
+      <p:sp>
+        <p:nvSpPr>
+          <p:cNvPr id="3" name="Notes Placeholder 2"/>
+          <p:cNvSpPr>
+            <a:spLocks noGrp="1"/>
+          </p:cNvSpPr>
+          <p:nvPr>
+            <p:ph type="body" idx="1"/>
+          </p:nvPr>
+        </p:nvSpPr>
+        <p:spPr/>
+        <p:txBody>
+          <a:bodyPr/>
+          <a:lstStyle/>
+          <a:p>
+            <a:r>
+              <a:rPr lang="en-US" dirty="0"/>
+              <a:t>https://www.everythingrf.com/rf-calculators/antenna-near-field-distance-calculator</a:t>
+            </a:r>
+          </a:p>
+          <a:p>
+            <a:r>
+              <a:rPr lang="en-US" dirty="0"/>
+              <a:t>https://www.antenna-theory.com/basics/radpattern.php</a:t>
+            </a:r>
+          </a:p>
+          <a:p>
+            <a:r>
+              <a:rPr lang="en-US" dirty="0"/>
+              <a:t>https://kb.ettus.com/images/2/2b/ettus_research_vert900_datasheet.pdf</a:t>
+            </a:r>
+          </a:p>
+        </p:txBody>
+      </p:sp>
+      <p:sp>
+        <p:nvSpPr>
+          <p:cNvPr id="4" name="Slide Number Placeholder 3"/>
+          <p:cNvSpPr>
+            <a:spLocks noGrp="1"/>
+          </p:cNvSpPr>
+          <p:nvPr>
+            <p:ph type="sldNum" sz="quarter" idx="5"/>
+          </p:nvPr>
+        </p:nvSpPr>
+        <p:spPr/>
+        <p:txBody>
+          <a:bodyPr/>
+          <a:lstStyle/>
+          <a:p>
+            <a:fld id="{CAA19DDD-B1BD-4DBB-A1A9-366082CC542B}" type="slidenum">
+              <a:rPr lang="en-US" smtClean="0"/>
+              <a:t>52</a:t>
+            </a:fld>
+            <a:endParaRPr lang="en-US"/>
+          </a:p>
+        </p:txBody>
+      </p:sp>
+    </p:spTree>
+    <p:extLst>
+      <p:ext uri="{BB962C8B-B14F-4D97-AF65-F5344CB8AC3E}">
+        <p14:creationId xmlns:p14="http://schemas.microsoft.com/office/powerpoint/2010/main" val="3378622665"/>
+      </p:ext>
+    </p:extLst>
+  </p:cSld>
+  <p:clrMapOvr>
+    <a:masterClrMapping/>
+  </p:clrMapOvr>
+</p:notes>
+</file>
+
 <file path=ppt/notesSlides/notesSlide3.xml><?xml version="1.0" encoding="utf-8"?>
 <p:notes xmlns:a="http://schemas.openxmlformats.org/drawingml/2006/main" xmlns:r="http://schemas.openxmlformats.org/officeDocument/2006/relationships" xmlns:p="http://schemas.openxmlformats.org/presentationml/2006/main">
   <p:cSld>
@@ -2665,7 +2789,7 @@
           <a:p>
             <a:fld id="{8C8B827B-D727-48E9-881C-E759228D42E3}" type="datetimeFigureOut">
               <a:rPr lang="en-US" smtClean="0"/>
-              <a:t>2/14/2024</a:t>
+              <a:t>4/9/2024</a:t>
             </a:fld>
             <a:endParaRPr lang="en-US"/>
           </a:p>
@@ -2863,7 +2987,7 @@
           <a:p>
             <a:fld id="{8C8B827B-D727-48E9-881C-E759228D42E3}" type="datetimeFigureOut">
               <a:rPr lang="en-US" smtClean="0"/>
-              <a:t>2/14/2024</a:t>
+              <a:t>4/9/2024</a:t>
             </a:fld>
             <a:endParaRPr lang="en-US"/>
           </a:p>
@@ -3071,7 +3195,7 @@
           <a:p>
             <a:fld id="{8C8B827B-D727-48E9-881C-E759228D42E3}" type="datetimeFigureOut">
               <a:rPr lang="en-US" smtClean="0"/>
-              <a:t>2/14/2024</a:t>
+              <a:t>4/9/2024</a:t>
             </a:fld>
             <a:endParaRPr lang="en-US"/>
           </a:p>
@@ -3554,7 +3678,7 @@
           <a:p>
             <a:fld id="{8C8B827B-D727-48E9-881C-E759228D42E3}" type="datetimeFigureOut">
               <a:rPr lang="en-US" smtClean="0"/>
-              <a:t>2/14/2024</a:t>
+              <a:t>4/9/2024</a:t>
             </a:fld>
             <a:endParaRPr lang="en-US"/>
           </a:p>
@@ -3829,7 +3953,7 @@
           <a:p>
             <a:fld id="{8C8B827B-D727-48E9-881C-E759228D42E3}" type="datetimeFigureOut">
               <a:rPr lang="en-US" smtClean="0"/>
-              <a:t>2/14/2024</a:t>
+              <a:t>4/9/2024</a:t>
             </a:fld>
             <a:endParaRPr lang="en-US"/>
           </a:p>
@@ -4094,7 +4218,7 @@
           <a:p>
             <a:fld id="{8C8B827B-D727-48E9-881C-E759228D42E3}" type="datetimeFigureOut">
               <a:rPr lang="en-US" smtClean="0"/>
-              <a:t>2/14/2024</a:t>
+              <a:t>4/9/2024</a:t>
             </a:fld>
             <a:endParaRPr lang="en-US"/>
           </a:p>
@@ -4506,7 +4630,7 @@
           <a:p>
             <a:fld id="{8C8B827B-D727-48E9-881C-E759228D42E3}" type="datetimeFigureOut">
               <a:rPr lang="en-US" smtClean="0"/>
-              <a:t>2/14/2024</a:t>
+              <a:t>4/9/2024</a:t>
             </a:fld>
             <a:endParaRPr lang="en-US"/>
           </a:p>
@@ -4647,7 +4771,7 @@
           <a:p>
             <a:fld id="{8C8B827B-D727-48E9-881C-E759228D42E3}" type="datetimeFigureOut">
               <a:rPr lang="en-US" smtClean="0"/>
-              <a:t>2/14/2024</a:t>
+              <a:t>4/9/2024</a:t>
             </a:fld>
             <a:endParaRPr lang="en-US"/>
           </a:p>
@@ -4760,7 +4884,7 @@
           <a:p>
             <a:fld id="{8C8B827B-D727-48E9-881C-E759228D42E3}" type="datetimeFigureOut">
               <a:rPr lang="en-US" smtClean="0"/>
-              <a:t>2/14/2024</a:t>
+              <a:t>4/9/2024</a:t>
             </a:fld>
             <a:endParaRPr lang="en-US"/>
           </a:p>
@@ -5071,7 +5195,7 @@
           <a:p>
             <a:fld id="{8C8B827B-D727-48E9-881C-E759228D42E3}" type="datetimeFigureOut">
               <a:rPr lang="en-US" smtClean="0"/>
-              <a:t>2/14/2024</a:t>
+              <a:t>4/9/2024</a:t>
             </a:fld>
             <a:endParaRPr lang="en-US"/>
           </a:p>
@@ -5359,7 +5483,7 @@
           <a:p>
             <a:fld id="{8C8B827B-D727-48E9-881C-E759228D42E3}" type="datetimeFigureOut">
               <a:rPr lang="en-US" smtClean="0"/>
-              <a:t>2/14/2024</a:t>
+              <a:t>4/9/2024</a:t>
             </a:fld>
             <a:endParaRPr lang="en-US"/>
           </a:p>
@@ -5600,7 +5724,7 @@
           <a:p>
             <a:fld id="{8C8B827B-D727-48E9-881C-E759228D42E3}" type="datetimeFigureOut">
               <a:rPr lang="en-US" smtClean="0"/>
-              <a:t>2/14/2024</a:t>
+              <a:t>4/9/2024</a:t>
             </a:fld>
             <a:endParaRPr lang="en-US"/>
           </a:p>
@@ -13993,6 +14117,530 @@
     <p:extLst>
       <p:ext uri="{BB962C8B-B14F-4D97-AF65-F5344CB8AC3E}">
         <p14:creationId xmlns:p14="http://schemas.microsoft.com/office/powerpoint/2010/main" val="3814779979"/>
+      </p:ext>
+    </p:extLst>
+  </p:cSld>
+  <p:clrMapOvr>
+    <a:masterClrMapping/>
+  </p:clrMapOvr>
+</p:sld>
+</file>
+
+<file path=ppt/slides/slide52.xml><?xml version="1.0" encoding="utf-8"?>
+<p:sld xmlns:a="http://schemas.openxmlformats.org/drawingml/2006/main" xmlns:r="http://schemas.openxmlformats.org/officeDocument/2006/relationships" xmlns:p="http://schemas.openxmlformats.org/presentationml/2006/main">
+  <p:cSld>
+    <p:spTree>
+      <p:nvGrpSpPr>
+        <p:cNvPr id="1" name=""/>
+        <p:cNvGrpSpPr/>
+        <p:nvPr/>
+      </p:nvGrpSpPr>
+      <p:grpSpPr>
+        <a:xfrm>
+          <a:off x="0" y="0"/>
+          <a:ext cx="0" cy="0"/>
+          <a:chOff x="0" y="0"/>
+          <a:chExt cx="0" cy="0"/>
+        </a:xfrm>
+      </p:grpSpPr>
+      <p:sp>
+        <p:nvSpPr>
+          <p:cNvPr id="2" name="Title 1">
+            <a:extLst>
+              <a:ext uri="{FF2B5EF4-FFF2-40B4-BE49-F238E27FC236}">
+                <a16:creationId xmlns:a16="http://schemas.microsoft.com/office/drawing/2014/main" id="{F4C454C9-957E-08D0-497A-D4E7854B08F7}"/>
+              </a:ext>
+            </a:extLst>
+          </p:cNvPr>
+          <p:cNvSpPr>
+            <a:spLocks noGrp="1"/>
+          </p:cNvSpPr>
+          <p:nvPr>
+            <p:ph type="title"/>
+          </p:nvPr>
+        </p:nvSpPr>
+        <p:spPr/>
+        <p:txBody>
+          <a:bodyPr/>
+          <a:lstStyle/>
+          <a:p>
+            <a:r>
+              <a:rPr lang="en-US" dirty="0"/>
+              <a:t>Antennas</a:t>
+            </a:r>
+          </a:p>
+        </p:txBody>
+      </p:sp>
+      <p:sp>
+        <p:nvSpPr>
+          <p:cNvPr id="3" name="Content Placeholder 2">
+            <a:extLst>
+              <a:ext uri="{FF2B5EF4-FFF2-40B4-BE49-F238E27FC236}">
+                <a16:creationId xmlns:a16="http://schemas.microsoft.com/office/drawing/2014/main" id="{45F0302D-89DF-B65D-622B-B0FD5EEF3171}"/>
+              </a:ext>
+            </a:extLst>
+          </p:cNvPr>
+          <p:cNvSpPr>
+            <a:spLocks noGrp="1"/>
+          </p:cNvSpPr>
+          <p:nvPr>
+            <p:ph idx="1"/>
+          </p:nvPr>
+        </p:nvSpPr>
+        <p:spPr>
+          <a:xfrm>
+            <a:off x="838200" y="1825625"/>
+            <a:ext cx="5062268" cy="4351338"/>
+          </a:xfrm>
+        </p:spPr>
+        <p:txBody>
+          <a:bodyPr/>
+          <a:lstStyle/>
+          <a:p>
+            <a:r>
+              <a:rPr lang="en-US" dirty="0"/>
+              <a:t>Make sure antennas are aligned</a:t>
+            </a:r>
+          </a:p>
+          <a:p>
+            <a:r>
+              <a:rPr lang="en-US" dirty="0"/>
+              <a:t>Check antenna datasheets and make sure they are compatible with your </a:t>
+            </a:r>
+            <a:r>
+              <a:rPr lang="en-US" dirty="0" err="1"/>
+              <a:t>tx</a:t>
+            </a:r>
+            <a:r>
+              <a:rPr lang="en-US" dirty="0"/>
+              <a:t> frequency </a:t>
+            </a:r>
+          </a:p>
+        </p:txBody>
+      </p:sp>
+      <p:pic>
+        <p:nvPicPr>
+          <p:cNvPr id="7" name="Picture 6">
+            <a:extLst>
+              <a:ext uri="{FF2B5EF4-FFF2-40B4-BE49-F238E27FC236}">
+                <a16:creationId xmlns:a16="http://schemas.microsoft.com/office/drawing/2014/main" id="{01EC5783-3383-6660-E09D-DCAF8ED174D9}"/>
+              </a:ext>
+            </a:extLst>
+          </p:cNvPr>
+          <p:cNvPicPr>
+            <a:picLocks noChangeAspect="1"/>
+          </p:cNvPicPr>
+          <p:nvPr/>
+        </p:nvPicPr>
+        <p:blipFill>
+          <a:blip r:embed="rId3"/>
+          <a:stretch>
+            <a:fillRect/>
+          </a:stretch>
+        </p:blipFill>
+        <p:spPr>
+          <a:xfrm>
+            <a:off x="6171687" y="365125"/>
+            <a:ext cx="5614871" cy="6038490"/>
+          </a:xfrm>
+          <a:prstGeom prst="rect">
+            <a:avLst/>
+          </a:prstGeom>
+        </p:spPr>
+      </p:pic>
+      <p:pic>
+        <p:nvPicPr>
+          <p:cNvPr id="9" name="Picture 8">
+            <a:extLst>
+              <a:ext uri="{FF2B5EF4-FFF2-40B4-BE49-F238E27FC236}">
+                <a16:creationId xmlns:a16="http://schemas.microsoft.com/office/drawing/2014/main" id="{0639EF7A-C168-D06E-D2D1-75C0FFA0F516}"/>
+              </a:ext>
+            </a:extLst>
+          </p:cNvPr>
+          <p:cNvPicPr>
+            <a:picLocks noChangeAspect="1"/>
+          </p:cNvPicPr>
+          <p:nvPr/>
+        </p:nvPicPr>
+        <p:blipFill>
+          <a:blip r:embed="rId4"/>
+          <a:stretch>
+            <a:fillRect/>
+          </a:stretch>
+        </p:blipFill>
+        <p:spPr>
+          <a:xfrm>
+            <a:off x="1210829" y="3679165"/>
+            <a:ext cx="4188259" cy="3029681"/>
+          </a:xfrm>
+          <a:prstGeom prst="rect">
+            <a:avLst/>
+          </a:prstGeom>
+        </p:spPr>
+      </p:pic>
+    </p:spTree>
+    <p:extLst>
+      <p:ext uri="{BB962C8B-B14F-4D97-AF65-F5344CB8AC3E}">
+        <p14:creationId xmlns:p14="http://schemas.microsoft.com/office/powerpoint/2010/main" val="1599718125"/>
+      </p:ext>
+    </p:extLst>
+  </p:cSld>
+  <p:clrMapOvr>
+    <a:masterClrMapping/>
+  </p:clrMapOvr>
+</p:sld>
+</file>
+
+<file path=ppt/slides/slide53.xml><?xml version="1.0" encoding="utf-8"?>
+<p:sld xmlns:a="http://schemas.openxmlformats.org/drawingml/2006/main" xmlns:r="http://schemas.openxmlformats.org/officeDocument/2006/relationships" xmlns:p="http://schemas.openxmlformats.org/presentationml/2006/main">
+  <p:cSld>
+    <p:spTree>
+      <p:nvGrpSpPr>
+        <p:cNvPr id="1" name="">
+          <a:extLst>
+            <a:ext uri="{FF2B5EF4-FFF2-40B4-BE49-F238E27FC236}">
+              <a16:creationId xmlns:a16="http://schemas.microsoft.com/office/drawing/2014/main" id="{82886631-EB94-B17A-1EB6-1C91F4AC4803}"/>
+            </a:ext>
+          </a:extLst>
+        </p:cNvPr>
+        <p:cNvGrpSpPr/>
+        <p:nvPr/>
+      </p:nvGrpSpPr>
+      <p:grpSpPr>
+        <a:xfrm>
+          <a:off x="0" y="0"/>
+          <a:ext cx="0" cy="0"/>
+          <a:chOff x="0" y="0"/>
+          <a:chExt cx="0" cy="0"/>
+        </a:xfrm>
+      </p:grpSpPr>
+      <p:sp>
+        <p:nvSpPr>
+          <p:cNvPr id="2" name="Title 1">
+            <a:extLst>
+              <a:ext uri="{FF2B5EF4-FFF2-40B4-BE49-F238E27FC236}">
+                <a16:creationId xmlns:a16="http://schemas.microsoft.com/office/drawing/2014/main" id="{BBF6CA32-B6AA-4C8B-D8FB-30097F821BED}"/>
+              </a:ext>
+            </a:extLst>
+          </p:cNvPr>
+          <p:cNvSpPr>
+            <a:spLocks noGrp="1"/>
+          </p:cNvSpPr>
+          <p:nvPr>
+            <p:ph type="title"/>
+          </p:nvPr>
+        </p:nvSpPr>
+        <p:spPr/>
+        <p:txBody>
+          <a:bodyPr/>
+          <a:lstStyle/>
+          <a:p>
+            <a:r>
+              <a:rPr lang="en-US" dirty="0"/>
+              <a:t>Channel characterization</a:t>
+            </a:r>
+          </a:p>
+        </p:txBody>
+      </p:sp>
+      <p:sp>
+        <p:nvSpPr>
+          <p:cNvPr id="3" name="Content Placeholder 2">
+            <a:extLst>
+              <a:ext uri="{FF2B5EF4-FFF2-40B4-BE49-F238E27FC236}">
+                <a16:creationId xmlns:a16="http://schemas.microsoft.com/office/drawing/2014/main" id="{E565031F-51AB-882A-DB51-9DF1752D15C5}"/>
+              </a:ext>
+            </a:extLst>
+          </p:cNvPr>
+          <p:cNvSpPr>
+            <a:spLocks noGrp="1"/>
+          </p:cNvSpPr>
+          <p:nvPr>
+            <p:ph idx="1"/>
+          </p:nvPr>
+        </p:nvSpPr>
+        <p:spPr>
+          <a:xfrm>
+            <a:off x="838200" y="1825624"/>
+            <a:ext cx="10515600" cy="1603375"/>
+          </a:xfrm>
+        </p:spPr>
+        <p:txBody>
+          <a:bodyPr>
+            <a:normAutofit fontScale="92500" lnSpcReduction="20000"/>
+          </a:bodyPr>
+          <a:lstStyle/>
+          <a:p>
+            <a:r>
+              <a:rPr lang="en-US" dirty="0"/>
+              <a:t>8 inch antenna</a:t>
+            </a:r>
+          </a:p>
+          <a:p>
+            <a:r>
+              <a:rPr lang="en-US" dirty="0"/>
+              <a:t>2 meter distance</a:t>
+            </a:r>
+          </a:p>
+          <a:p>
+            <a:r>
+              <a:rPr lang="en-US" dirty="0"/>
+              <a:t>915 MHz</a:t>
+            </a:r>
+          </a:p>
+          <a:p>
+            <a:r>
+              <a:rPr lang="en-US" dirty="0"/>
+              <a:t>Far field measurement</a:t>
+            </a:r>
+          </a:p>
+          <a:p>
+            <a:endParaRPr lang="en-US" dirty="0"/>
+          </a:p>
+        </p:txBody>
+      </p:sp>
+      <p:pic>
+        <p:nvPicPr>
+          <p:cNvPr id="7" name="Picture 6">
+            <a:extLst>
+              <a:ext uri="{FF2B5EF4-FFF2-40B4-BE49-F238E27FC236}">
+                <a16:creationId xmlns:a16="http://schemas.microsoft.com/office/drawing/2014/main" id="{CF5CEE0B-EE1B-AD40-B165-001B72E3F40A}"/>
+              </a:ext>
+            </a:extLst>
+          </p:cNvPr>
+          <p:cNvPicPr>
+            <a:picLocks noChangeAspect="1"/>
+          </p:cNvPicPr>
+          <p:nvPr/>
+        </p:nvPicPr>
+        <p:blipFill>
+          <a:blip r:embed="rId2"/>
+          <a:stretch>
+            <a:fillRect/>
+          </a:stretch>
+        </p:blipFill>
+        <p:spPr>
+          <a:xfrm>
+            <a:off x="174773" y="3424423"/>
+            <a:ext cx="3701487" cy="3258060"/>
+          </a:xfrm>
+          <a:prstGeom prst="rect">
+            <a:avLst/>
+          </a:prstGeom>
+        </p:spPr>
+      </p:pic>
+      <p:pic>
+        <p:nvPicPr>
+          <p:cNvPr id="1026" name="Picture 2" descr="APrP3qHeTStr0PHHQ9Nf-uCnJ-Loa_kuCha7an0VuorK8i8LdFIoPyKi784Y4L_A8qGWCk7QJlTFoqBJmlL5IXzSlZKyWJNnT_dLIrOYskbZdqCChsADF77y09TkXPLple0b0fpK1G7_JcMgHsFhSXTsV-Rn6M4EYiNt3EF04LLrzoe4yLniSrRO-qm7P39ZaaumcFsGtiL1w8e26rNwRdIJIcKSp2r8Y6QvDBMItyiclQ0KPUN1Sa9kgdS24s0k-HsrQdlJu4Cp5EdFvhl4_gUAE15u2_yPnqtYrgyUoTPzggWiVoKnwDUJWIXBiyXqShOSqtQRq1piQP-s9Me8yCHMyAl0F98PK2PdyB-ZWnxCQYJT4bO0U21RuEpIGsJBorA4Bh7eFjUD4X6K4Tgxns9E55ygOFyQC0F61YpLQ7iHg_RgyoSgGNes4OVUT8TO-74bd28FV3NmUd-rThUvdD3al1xe-5ke-j15dyHf2i2Q4eLgPzI6m5n_q2Aw3xg_eWDO6rdIPDPNd-5MuPnGtlFLbaHYGpRn3lT1UgKNswL5typcVXyDpqjXwEd5_j6vNlc6XWy7ba8UBj6iyPtTYRR7CYh3xuiXt4E4TPY35U76JO8xzXZt-gsZ7WTkV8EHnXDpn7h6ipKQet92ylBktIuEUfZjV7iQhC0OJF21nCUX2tz9y9vuSYaVANLg4CClRany2j-a-5xWuBfGSjBZoMeMBqvGhy_NSw-PU4khpzOPl3M4f-Oeiu1XwdaibnNt2ynXXPEn3IO26H1pYlY9lJDG9OvDl4HM2XWF00Fzt0etuZxJ8LPMTpM--ZZGx-awnfrn2w6qdCsaetuH6Vtdc4Nztf7MXbOO342btSZIaEd9OIXjABLHEOCgkGig28DoJwyvlv2LUkZRokrcX-o_ATulKwKpHQ6VG97j69S1Ppr3iqT5GA3xZP3elH_VjiAML5Bb5o8_EVQwZS4xh6FHBX6BwFq_tQCNsfKPFgRktupzJLZvbWI7PIYvOeuPvZ0u-HWCNSnqeg8KsfpZyX07Eg=s0-l75-ft (3024×4032)">
+            <a:extLst>
+              <a:ext uri="{FF2B5EF4-FFF2-40B4-BE49-F238E27FC236}">
+                <a16:creationId xmlns:a16="http://schemas.microsoft.com/office/drawing/2014/main" id="{EE5F0A74-17D4-0FBB-8BB8-A32489F8047C}"/>
+              </a:ext>
+            </a:extLst>
+          </p:cNvPr>
+          <p:cNvPicPr>
+            <a:picLocks noChangeAspect="1" noChangeArrowheads="1"/>
+          </p:cNvPicPr>
+          <p:nvPr/>
+        </p:nvPicPr>
+        <p:blipFill>
+          <a:blip r:embed="rId3">
+            <a:extLst>
+              <a:ext uri="{28A0092B-C50C-407E-A947-70E740481C1C}">
+                <a14:useLocalDpi xmlns:a14="http://schemas.microsoft.com/office/drawing/2010/main" val="0"/>
+              </a:ext>
+            </a:extLst>
+          </a:blip>
+          <a:srcRect/>
+          <a:stretch>
+            <a:fillRect/>
+          </a:stretch>
+        </p:blipFill>
+        <p:spPr bwMode="auto">
+          <a:xfrm>
+            <a:off x="7231534" y="301560"/>
+            <a:ext cx="4785692" cy="6380922"/>
+          </a:xfrm>
+          <a:prstGeom prst="rect">
+            <a:avLst/>
+          </a:prstGeom>
+          <a:noFill/>
+          <a:extLst>
+            <a:ext uri="{909E8E84-426E-40DD-AFC4-6F175D3DCCD1}">
+              <a14:hiddenFill xmlns:a14="http://schemas.microsoft.com/office/drawing/2010/main">
+                <a:solidFill>
+                  <a:srgbClr val="FFFFFF"/>
+                </a:solidFill>
+              </a14:hiddenFill>
+            </a:ext>
+          </a:extLst>
+        </p:spPr>
+      </p:pic>
+    </p:spTree>
+    <p:extLst>
+      <p:ext uri="{BB962C8B-B14F-4D97-AF65-F5344CB8AC3E}">
+        <p14:creationId xmlns:p14="http://schemas.microsoft.com/office/powerpoint/2010/main" val="2123179864"/>
+      </p:ext>
+    </p:extLst>
+  </p:cSld>
+  <p:clrMapOvr>
+    <a:masterClrMapping/>
+  </p:clrMapOvr>
+</p:sld>
+</file>
+
+<file path=ppt/slides/slide54.xml><?xml version="1.0" encoding="utf-8"?>
+<p:sld xmlns:a="http://schemas.openxmlformats.org/drawingml/2006/main" xmlns:r="http://schemas.openxmlformats.org/officeDocument/2006/relationships" xmlns:p="http://schemas.openxmlformats.org/presentationml/2006/main">
+  <p:cSld>
+    <p:spTree>
+      <p:nvGrpSpPr>
+        <p:cNvPr id="1" name="">
+          <a:extLst>
+            <a:ext uri="{FF2B5EF4-FFF2-40B4-BE49-F238E27FC236}">
+              <a16:creationId xmlns:a16="http://schemas.microsoft.com/office/drawing/2014/main" id="{8BDCBFBA-DA1B-D14E-3166-61BC13EE6A09}"/>
+            </a:ext>
+          </a:extLst>
+        </p:cNvPr>
+        <p:cNvGrpSpPr/>
+        <p:nvPr/>
+      </p:nvGrpSpPr>
+      <p:grpSpPr>
+        <a:xfrm>
+          <a:off x="0" y="0"/>
+          <a:ext cx="0" cy="0"/>
+          <a:chOff x="0" y="0"/>
+          <a:chExt cx="0" cy="0"/>
+        </a:xfrm>
+      </p:grpSpPr>
+      <p:sp>
+        <p:nvSpPr>
+          <p:cNvPr id="2" name="Title 1">
+            <a:extLst>
+              <a:ext uri="{FF2B5EF4-FFF2-40B4-BE49-F238E27FC236}">
+                <a16:creationId xmlns:a16="http://schemas.microsoft.com/office/drawing/2014/main" id="{1CAD472D-EFD6-6FC8-AFC5-E51073AD0F64}"/>
+              </a:ext>
+            </a:extLst>
+          </p:cNvPr>
+          <p:cNvSpPr>
+            <a:spLocks noGrp="1"/>
+          </p:cNvSpPr>
+          <p:nvPr>
+            <p:ph type="title"/>
+          </p:nvPr>
+        </p:nvSpPr>
+        <p:spPr/>
+        <p:txBody>
+          <a:bodyPr/>
+          <a:lstStyle/>
+          <a:p>
+            <a:r>
+              <a:rPr lang="en-US" dirty="0"/>
+              <a:t>Range</a:t>
+            </a:r>
+          </a:p>
+        </p:txBody>
+      </p:sp>
+      <p:sp>
+        <p:nvSpPr>
+          <p:cNvPr id="3" name="Content Placeholder 2">
+            <a:extLst>
+              <a:ext uri="{FF2B5EF4-FFF2-40B4-BE49-F238E27FC236}">
+                <a16:creationId xmlns:a16="http://schemas.microsoft.com/office/drawing/2014/main" id="{01EC4C42-76BB-DCF8-940C-EF1218F67999}"/>
+              </a:ext>
+            </a:extLst>
+          </p:cNvPr>
+          <p:cNvSpPr>
+            <a:spLocks noGrp="1"/>
+          </p:cNvSpPr>
+          <p:nvPr>
+            <p:ph idx="1"/>
+          </p:nvPr>
+        </p:nvSpPr>
+        <p:spPr/>
+        <p:txBody>
+          <a:bodyPr/>
+          <a:lstStyle/>
+          <a:p>
+            <a:r>
+              <a:rPr lang="en-US" dirty="0"/>
+              <a:t>How does our SNR vary with distance?</a:t>
+            </a:r>
+          </a:p>
+          <a:p>
+            <a:r>
+              <a:rPr lang="en-US" dirty="0" err="1"/>
+              <a:t>Friis</a:t>
+            </a:r>
+            <a:r>
+              <a:rPr lang="en-US" dirty="0"/>
+              <a:t>’ equation (far field)</a:t>
+            </a:r>
+          </a:p>
+        </p:txBody>
+      </p:sp>
+      <p:pic>
+        <p:nvPicPr>
+          <p:cNvPr id="5" name="Picture 4">
+            <a:extLst>
+              <a:ext uri="{FF2B5EF4-FFF2-40B4-BE49-F238E27FC236}">
+                <a16:creationId xmlns:a16="http://schemas.microsoft.com/office/drawing/2014/main" id="{FC9D075B-FEEB-AF9B-5F89-69A347BB630D}"/>
+              </a:ext>
+            </a:extLst>
+          </p:cNvPr>
+          <p:cNvPicPr>
+            <a:picLocks noChangeAspect="1"/>
+          </p:cNvPicPr>
+          <p:nvPr/>
+        </p:nvPicPr>
+        <p:blipFill>
+          <a:blip r:embed="rId2"/>
+          <a:stretch>
+            <a:fillRect/>
+          </a:stretch>
+        </p:blipFill>
+        <p:spPr>
+          <a:xfrm>
+            <a:off x="1468875" y="3029649"/>
+            <a:ext cx="1959483" cy="798702"/>
+          </a:xfrm>
+          <a:prstGeom prst="rect">
+            <a:avLst/>
+          </a:prstGeom>
+        </p:spPr>
+      </p:pic>
+      <p:pic>
+        <p:nvPicPr>
+          <p:cNvPr id="6" name="Picture 5">
+            <a:extLst>
+              <a:ext uri="{FF2B5EF4-FFF2-40B4-BE49-F238E27FC236}">
+                <a16:creationId xmlns:a16="http://schemas.microsoft.com/office/drawing/2014/main" id="{4515EB4A-3D80-0CB8-C97B-BA513935CAB1}"/>
+              </a:ext>
+            </a:extLst>
+          </p:cNvPr>
+          <p:cNvPicPr>
+            <a:picLocks noChangeAspect="1"/>
+          </p:cNvPicPr>
+          <p:nvPr/>
+        </p:nvPicPr>
+        <p:blipFill>
+          <a:blip r:embed="rId3"/>
+          <a:stretch>
+            <a:fillRect/>
+          </a:stretch>
+        </p:blipFill>
+        <p:spPr>
+          <a:xfrm>
+            <a:off x="6456291" y="2491817"/>
+            <a:ext cx="5153744" cy="4001058"/>
+          </a:xfrm>
+          <a:prstGeom prst="rect">
+            <a:avLst/>
+          </a:prstGeom>
+        </p:spPr>
+      </p:pic>
+    </p:spTree>
+    <p:extLst>
+      <p:ext uri="{BB962C8B-B14F-4D97-AF65-F5344CB8AC3E}">
+        <p14:creationId xmlns:p14="http://schemas.microsoft.com/office/powerpoint/2010/main" val="2247479636"/>
       </p:ext>
     </p:extLst>
   </p:cSld>

</xml_diff>